<commit_message>
Clean up language in example Cell Division comic
</commit_message>
<xml_diff>
--- a/files/science/Cell Division Comics - Slides.pptx
+++ b/files/science/Cell Division Comics - Slides.pptx
@@ -21,26 +21,11 @@
   <p:notesSz cx="6858000" cy="9144000"/>
   <p:embeddedFontLst>
     <p:embeddedFont>
-      <p:font typeface="Calibri" panose="020F0502020204030204" pitchFamily="34" charset="0"/>
+      <p:font typeface="Cambria" panose="02040503050406030204" pitchFamily="18" charset="0"/>
       <p:regular r:id="rId11"/>
       <p:bold r:id="rId12"/>
       <p:italic r:id="rId13"/>
       <p:boldItalic r:id="rId14"/>
-    </p:embeddedFont>
-    <p:embeddedFont>
-      <p:font typeface="Bree Serif" panose="020B0604020202020204" charset="0"/>
-      <p:regular r:id="rId15"/>
-    </p:embeddedFont>
-    <p:embeddedFont>
-      <p:font typeface="Lemon" panose="020B0604020202020204" charset="0"/>
-      <p:regular r:id="rId16"/>
-    </p:embeddedFont>
-    <p:embeddedFont>
-      <p:font typeface="Cambria" panose="02040503050406030204" pitchFamily="18" charset="0"/>
-      <p:regular r:id="rId17"/>
-      <p:bold r:id="rId18"/>
-      <p:italic r:id="rId19"/>
-      <p:boldItalic r:id="rId20"/>
     </p:embeddedFont>
   </p:embeddedFontLst>
   <p:defaultTextStyle>
@@ -245,11 +230,12 @@
       </a:defRPr>
     </a:lvl9pPr>
   </p:defaultTextStyle>
+  <p:extLst>
+    <p:ext uri="{EFAFB233-063F-42B5-8137-9DF3F51BA10A}">
+      <p15:sldGuideLst xmlns:p15="http://schemas.microsoft.com/office/powerpoint/2012/main"/>
+    </p:ext>
+  </p:extLst>
 </p:presentation>
-</file>
-
-<file path=ppt/revisionInfo.xml><?xml version="1.0" encoding="utf-8"?>
-<p1510:revInfo xmlns:a="http://schemas.openxmlformats.org/drawingml/2006/main" xmlns:r="http://schemas.openxmlformats.org/officeDocument/2006/relationships" xmlns:p1510="http://schemas.microsoft.com/office/powerpoint/2015/10/main"/>
 </file>
 
 <file path=ppt/notesMasters/notesMaster1.xml><?xml version="1.0" encoding="utf-8"?>
@@ -1061,7 +1047,7 @@
         </p:nvSpPr>
         <p:spPr>
           <a:xfrm>
-            <a:off x="381300" y="685800"/>
+            <a:off x="381000" y="685800"/>
             <a:ext cx="6096000" cy="3429000"/>
           </a:xfrm>
           <a:custGeom>
@@ -5138,17 +5124,14 @@
           <p:nvPr/>
         </p:nvPicPr>
         <p:blipFill>
-          <a:blip r:embed="rId3">
-            <a:alphaModFix/>
-          </a:blip>
-          <a:stretch>
-            <a:fillRect/>
-          </a:stretch>
+          <a:blip r:embed="rId3"/>
+          <a:srcRect/>
+          <a:stretch/>
         </p:blipFill>
         <p:spPr>
           <a:xfrm>
-            <a:off x="1460600" y="152400"/>
-            <a:ext cx="6222800" cy="4820750"/>
+            <a:off x="1463885" y="152400"/>
+            <a:ext cx="6216230" cy="4820750"/>
           </a:xfrm>
           <a:prstGeom prst="rect">
             <a:avLst/>

</xml_diff>